<commit_message>
add picture to Viite manual
</commit_message>
<xml_diff>
--- a/viite-UI/manual/Presentation3.pptx
+++ b/viite-UI/manual/Presentation3.pptx
@@ -104,6 +104,11 @@
       </a:defRPr>
     </a:lvl9pPr>
   </p:defaultTextStyle>
+  <p:extLst>
+    <p:ext uri="{EFAFB233-063F-42B5-8137-9DF3F51BA10A}">
+      <p15:sldGuideLst xmlns:p15="http://schemas.microsoft.com/office/powerpoint/2012/main"/>
+    </p:ext>
+  </p:extLst>
 </p:presentation>
 </file>
 
@@ -149,10 +154,9 @@
           </a:lstStyle>
           <a:p>
             <a:r>
-              <a:rPr lang="en-US" smtClean="0"/>
+              <a:rPr lang="en-US"/>
               <a:t>Click to edit Master title style</a:t>
             </a:r>
-            <a:endParaRPr lang="en-US"/>
           </a:p>
         </p:txBody>
       </p:sp>
@@ -214,10 +218,9 @@
           </a:lstStyle>
           <a:p>
             <a:r>
-              <a:rPr lang="en-US" smtClean="0"/>
+              <a:rPr lang="en-US"/>
               <a:t>Click to edit Master subtitle style</a:t>
             </a:r>
-            <a:endParaRPr lang="en-US"/>
           </a:p>
         </p:txBody>
       </p:sp>
@@ -238,7 +241,7 @@
           <a:p>
             <a:fld id="{74FFB22B-A148-4F74-AF06-5FED847E551E}" type="datetimeFigureOut">
               <a:rPr lang="en-US" smtClean="0"/>
-              <a:t>10/18/2016</a:t>
+              <a:t>7/4/2017</a:t>
             </a:fld>
             <a:endParaRPr lang="en-US"/>
           </a:p>
@@ -332,10 +335,9 @@
           <a:lstStyle/>
           <a:p>
             <a:r>
-              <a:rPr lang="en-US" smtClean="0"/>
+              <a:rPr lang="en-US"/>
               <a:t>Click to edit Master title style</a:t>
             </a:r>
-            <a:endParaRPr lang="en-US"/>
           </a:p>
         </p:txBody>
       </p:sp>
@@ -356,38 +358,37 @@
           <a:p>
             <a:pPr lvl="0"/>
             <a:r>
-              <a:rPr lang="en-US" smtClean="0"/>
+              <a:rPr lang="en-US"/>
               <a:t>Click to edit Master text styles</a:t>
             </a:r>
           </a:p>
           <a:p>
             <a:pPr lvl="1"/>
             <a:r>
-              <a:rPr lang="en-US" smtClean="0"/>
+              <a:rPr lang="en-US"/>
               <a:t>Second level</a:t>
             </a:r>
           </a:p>
           <a:p>
             <a:pPr lvl="2"/>
             <a:r>
-              <a:rPr lang="en-US" smtClean="0"/>
+              <a:rPr lang="en-US"/>
               <a:t>Third level</a:t>
             </a:r>
           </a:p>
           <a:p>
             <a:pPr lvl="3"/>
             <a:r>
-              <a:rPr lang="en-US" smtClean="0"/>
+              <a:rPr lang="en-US"/>
               <a:t>Fourth level</a:t>
             </a:r>
           </a:p>
           <a:p>
             <a:pPr lvl="4"/>
             <a:r>
-              <a:rPr lang="en-US" smtClean="0"/>
+              <a:rPr lang="en-US"/>
               <a:t>Fifth level</a:t>
             </a:r>
-            <a:endParaRPr lang="en-US"/>
           </a:p>
         </p:txBody>
       </p:sp>
@@ -408,7 +409,7 @@
           <a:p>
             <a:fld id="{74FFB22B-A148-4F74-AF06-5FED847E551E}" type="datetimeFigureOut">
               <a:rPr lang="en-US" smtClean="0"/>
-              <a:t>10/18/2016</a:t>
+              <a:t>7/4/2017</a:t>
             </a:fld>
             <a:endParaRPr lang="en-US"/>
           </a:p>
@@ -507,10 +508,9 @@
           <a:lstStyle/>
           <a:p>
             <a:r>
-              <a:rPr lang="en-US" smtClean="0"/>
+              <a:rPr lang="en-US"/>
               <a:t>Click to edit Master title style</a:t>
             </a:r>
-            <a:endParaRPr lang="en-US"/>
           </a:p>
         </p:txBody>
       </p:sp>
@@ -536,38 +536,37 @@
           <a:p>
             <a:pPr lvl="0"/>
             <a:r>
-              <a:rPr lang="en-US" smtClean="0"/>
+              <a:rPr lang="en-US"/>
               <a:t>Click to edit Master text styles</a:t>
             </a:r>
           </a:p>
           <a:p>
             <a:pPr lvl="1"/>
             <a:r>
-              <a:rPr lang="en-US" smtClean="0"/>
+              <a:rPr lang="en-US"/>
               <a:t>Second level</a:t>
             </a:r>
           </a:p>
           <a:p>
             <a:pPr lvl="2"/>
             <a:r>
-              <a:rPr lang="en-US" smtClean="0"/>
+              <a:rPr lang="en-US"/>
               <a:t>Third level</a:t>
             </a:r>
           </a:p>
           <a:p>
             <a:pPr lvl="3"/>
             <a:r>
-              <a:rPr lang="en-US" smtClean="0"/>
+              <a:rPr lang="en-US"/>
               <a:t>Fourth level</a:t>
             </a:r>
           </a:p>
           <a:p>
             <a:pPr lvl="4"/>
             <a:r>
-              <a:rPr lang="en-US" smtClean="0"/>
+              <a:rPr lang="en-US"/>
               <a:t>Fifth level</a:t>
             </a:r>
-            <a:endParaRPr lang="en-US"/>
           </a:p>
         </p:txBody>
       </p:sp>
@@ -588,7 +587,7 @@
           <a:p>
             <a:fld id="{74FFB22B-A148-4F74-AF06-5FED847E551E}" type="datetimeFigureOut">
               <a:rPr lang="en-US" smtClean="0"/>
-              <a:t>10/18/2016</a:t>
+              <a:t>7/4/2017</a:t>
             </a:fld>
             <a:endParaRPr lang="en-US"/>
           </a:p>
@@ -682,10 +681,9 @@
           <a:lstStyle/>
           <a:p>
             <a:r>
-              <a:rPr lang="en-US" smtClean="0"/>
+              <a:rPr lang="en-US"/>
               <a:t>Click to edit Master title style</a:t>
             </a:r>
-            <a:endParaRPr lang="en-US"/>
           </a:p>
         </p:txBody>
       </p:sp>
@@ -706,38 +704,37 @@
           <a:p>
             <a:pPr lvl="0"/>
             <a:r>
-              <a:rPr lang="en-US" smtClean="0"/>
+              <a:rPr lang="en-US"/>
               <a:t>Click to edit Master text styles</a:t>
             </a:r>
           </a:p>
           <a:p>
             <a:pPr lvl="1"/>
             <a:r>
-              <a:rPr lang="en-US" smtClean="0"/>
+              <a:rPr lang="en-US"/>
               <a:t>Second level</a:t>
             </a:r>
           </a:p>
           <a:p>
             <a:pPr lvl="2"/>
             <a:r>
-              <a:rPr lang="en-US" smtClean="0"/>
+              <a:rPr lang="en-US"/>
               <a:t>Third level</a:t>
             </a:r>
           </a:p>
           <a:p>
             <a:pPr lvl="3"/>
             <a:r>
-              <a:rPr lang="en-US" smtClean="0"/>
+              <a:rPr lang="en-US"/>
               <a:t>Fourth level</a:t>
             </a:r>
           </a:p>
           <a:p>
             <a:pPr lvl="4"/>
             <a:r>
-              <a:rPr lang="en-US" smtClean="0"/>
+              <a:rPr lang="en-US"/>
               <a:t>Fifth level</a:t>
             </a:r>
-            <a:endParaRPr lang="en-US"/>
           </a:p>
         </p:txBody>
       </p:sp>
@@ -758,7 +755,7 @@
           <a:p>
             <a:fld id="{74FFB22B-A148-4F74-AF06-5FED847E551E}" type="datetimeFigureOut">
               <a:rPr lang="en-US" smtClean="0"/>
-              <a:t>10/18/2016</a:t>
+              <a:t>7/4/2017</a:t>
             </a:fld>
             <a:endParaRPr lang="en-US"/>
           </a:p>
@@ -861,10 +858,9 @@
           </a:lstStyle>
           <a:p>
             <a:r>
-              <a:rPr lang="en-US" smtClean="0"/>
+              <a:rPr lang="en-US"/>
               <a:t>Click to edit Master title style</a:t>
             </a:r>
-            <a:endParaRPr lang="en-US"/>
           </a:p>
         </p:txBody>
       </p:sp>
@@ -981,7 +977,7 @@
           <a:p>
             <a:pPr lvl="0"/>
             <a:r>
-              <a:rPr lang="en-US" smtClean="0"/>
+              <a:rPr lang="en-US"/>
               <a:t>Click to edit Master text styles</a:t>
             </a:r>
           </a:p>
@@ -1004,7 +1000,7 @@
           <a:p>
             <a:fld id="{74FFB22B-A148-4F74-AF06-5FED847E551E}" type="datetimeFigureOut">
               <a:rPr lang="en-US" smtClean="0"/>
-              <a:t>10/18/2016</a:t>
+              <a:t>7/4/2017</a:t>
             </a:fld>
             <a:endParaRPr lang="en-US"/>
           </a:p>
@@ -1098,10 +1094,9 @@
           <a:lstStyle/>
           <a:p>
             <a:r>
-              <a:rPr lang="en-US" smtClean="0"/>
+              <a:rPr lang="en-US"/>
               <a:t>Click to edit Master title style</a:t>
             </a:r>
-            <a:endParaRPr lang="en-US"/>
           </a:p>
         </p:txBody>
       </p:sp>
@@ -1127,38 +1122,37 @@
           <a:p>
             <a:pPr lvl="0"/>
             <a:r>
-              <a:rPr lang="en-US" smtClean="0"/>
+              <a:rPr lang="en-US"/>
               <a:t>Click to edit Master text styles</a:t>
             </a:r>
           </a:p>
           <a:p>
             <a:pPr lvl="1"/>
             <a:r>
-              <a:rPr lang="en-US" smtClean="0"/>
+              <a:rPr lang="en-US"/>
               <a:t>Second level</a:t>
             </a:r>
           </a:p>
           <a:p>
             <a:pPr lvl="2"/>
             <a:r>
-              <a:rPr lang="en-US" smtClean="0"/>
+              <a:rPr lang="en-US"/>
               <a:t>Third level</a:t>
             </a:r>
           </a:p>
           <a:p>
             <a:pPr lvl="3"/>
             <a:r>
-              <a:rPr lang="en-US" smtClean="0"/>
+              <a:rPr lang="en-US"/>
               <a:t>Fourth level</a:t>
             </a:r>
           </a:p>
           <a:p>
             <a:pPr lvl="4"/>
             <a:r>
-              <a:rPr lang="en-US" smtClean="0"/>
+              <a:rPr lang="en-US"/>
               <a:t>Fifth level</a:t>
             </a:r>
-            <a:endParaRPr lang="en-US"/>
           </a:p>
         </p:txBody>
       </p:sp>
@@ -1184,38 +1178,37 @@
           <a:p>
             <a:pPr lvl="0"/>
             <a:r>
-              <a:rPr lang="en-US" smtClean="0"/>
+              <a:rPr lang="en-US"/>
               <a:t>Click to edit Master text styles</a:t>
             </a:r>
           </a:p>
           <a:p>
             <a:pPr lvl="1"/>
             <a:r>
-              <a:rPr lang="en-US" smtClean="0"/>
+              <a:rPr lang="en-US"/>
               <a:t>Second level</a:t>
             </a:r>
           </a:p>
           <a:p>
             <a:pPr lvl="2"/>
             <a:r>
-              <a:rPr lang="en-US" smtClean="0"/>
+              <a:rPr lang="en-US"/>
               <a:t>Third level</a:t>
             </a:r>
           </a:p>
           <a:p>
             <a:pPr lvl="3"/>
             <a:r>
-              <a:rPr lang="en-US" smtClean="0"/>
+              <a:rPr lang="en-US"/>
               <a:t>Fourth level</a:t>
             </a:r>
           </a:p>
           <a:p>
             <a:pPr lvl="4"/>
             <a:r>
-              <a:rPr lang="en-US" smtClean="0"/>
+              <a:rPr lang="en-US"/>
               <a:t>Fifth level</a:t>
             </a:r>
-            <a:endParaRPr lang="en-US"/>
           </a:p>
         </p:txBody>
       </p:sp>
@@ -1236,7 +1229,7 @@
           <a:p>
             <a:fld id="{74FFB22B-A148-4F74-AF06-5FED847E551E}" type="datetimeFigureOut">
               <a:rPr lang="en-US" smtClean="0"/>
-              <a:t>10/18/2016</a:t>
+              <a:t>7/4/2017</a:t>
             </a:fld>
             <a:endParaRPr lang="en-US"/>
           </a:p>
@@ -1335,10 +1328,9 @@
           <a:lstStyle/>
           <a:p>
             <a:r>
-              <a:rPr lang="en-US" smtClean="0"/>
+              <a:rPr lang="en-US"/>
               <a:t>Click to edit Master title style</a:t>
             </a:r>
-            <a:endParaRPr lang="en-US"/>
           </a:p>
         </p:txBody>
       </p:sp>
@@ -1401,7 +1393,7 @@
           <a:p>
             <a:pPr lvl="0"/>
             <a:r>
-              <a:rPr lang="en-US" smtClean="0"/>
+              <a:rPr lang="en-US"/>
               <a:t>Click to edit Master text styles</a:t>
             </a:r>
           </a:p>
@@ -1429,38 +1421,37 @@
           <a:p>
             <a:pPr lvl="0"/>
             <a:r>
-              <a:rPr lang="en-US" smtClean="0"/>
+              <a:rPr lang="en-US"/>
               <a:t>Click to edit Master text styles</a:t>
             </a:r>
           </a:p>
           <a:p>
             <a:pPr lvl="1"/>
             <a:r>
-              <a:rPr lang="en-US" smtClean="0"/>
+              <a:rPr lang="en-US"/>
               <a:t>Second level</a:t>
             </a:r>
           </a:p>
           <a:p>
             <a:pPr lvl="2"/>
             <a:r>
-              <a:rPr lang="en-US" smtClean="0"/>
+              <a:rPr lang="en-US"/>
               <a:t>Third level</a:t>
             </a:r>
           </a:p>
           <a:p>
             <a:pPr lvl="3"/>
             <a:r>
-              <a:rPr lang="en-US" smtClean="0"/>
+              <a:rPr lang="en-US"/>
               <a:t>Fourth level</a:t>
             </a:r>
           </a:p>
           <a:p>
             <a:pPr lvl="4"/>
             <a:r>
-              <a:rPr lang="en-US" smtClean="0"/>
+              <a:rPr lang="en-US"/>
               <a:t>Fifth level</a:t>
             </a:r>
-            <a:endParaRPr lang="en-US"/>
           </a:p>
         </p:txBody>
       </p:sp>
@@ -1523,7 +1514,7 @@
           <a:p>
             <a:pPr lvl="0"/>
             <a:r>
-              <a:rPr lang="en-US" smtClean="0"/>
+              <a:rPr lang="en-US"/>
               <a:t>Click to edit Master text styles</a:t>
             </a:r>
           </a:p>
@@ -1551,38 +1542,37 @@
           <a:p>
             <a:pPr lvl="0"/>
             <a:r>
-              <a:rPr lang="en-US" smtClean="0"/>
+              <a:rPr lang="en-US"/>
               <a:t>Click to edit Master text styles</a:t>
             </a:r>
           </a:p>
           <a:p>
             <a:pPr lvl="1"/>
             <a:r>
-              <a:rPr lang="en-US" smtClean="0"/>
+              <a:rPr lang="en-US"/>
               <a:t>Second level</a:t>
             </a:r>
           </a:p>
           <a:p>
             <a:pPr lvl="2"/>
             <a:r>
-              <a:rPr lang="en-US" smtClean="0"/>
+              <a:rPr lang="en-US"/>
               <a:t>Third level</a:t>
             </a:r>
           </a:p>
           <a:p>
             <a:pPr lvl="3"/>
             <a:r>
-              <a:rPr lang="en-US" smtClean="0"/>
+              <a:rPr lang="en-US"/>
               <a:t>Fourth level</a:t>
             </a:r>
           </a:p>
           <a:p>
             <a:pPr lvl="4"/>
             <a:r>
-              <a:rPr lang="en-US" smtClean="0"/>
+              <a:rPr lang="en-US"/>
               <a:t>Fifth level</a:t>
             </a:r>
-            <a:endParaRPr lang="en-US"/>
           </a:p>
         </p:txBody>
       </p:sp>
@@ -1603,7 +1593,7 @@
           <a:p>
             <a:fld id="{74FFB22B-A148-4F74-AF06-5FED847E551E}" type="datetimeFigureOut">
               <a:rPr lang="en-US" smtClean="0"/>
-              <a:t>10/18/2016</a:t>
+              <a:t>7/4/2017</a:t>
             </a:fld>
             <a:endParaRPr lang="en-US"/>
           </a:p>
@@ -1697,10 +1687,9 @@
           <a:lstStyle/>
           <a:p>
             <a:r>
-              <a:rPr lang="en-US" smtClean="0"/>
+              <a:rPr lang="en-US"/>
               <a:t>Click to edit Master title style</a:t>
             </a:r>
-            <a:endParaRPr lang="en-US"/>
           </a:p>
         </p:txBody>
       </p:sp>
@@ -1721,7 +1710,7 @@
           <a:p>
             <a:fld id="{74FFB22B-A148-4F74-AF06-5FED847E551E}" type="datetimeFigureOut">
               <a:rPr lang="en-US" smtClean="0"/>
-              <a:t>10/18/2016</a:t>
+              <a:t>7/4/2017</a:t>
             </a:fld>
             <a:endParaRPr lang="en-US"/>
           </a:p>
@@ -1816,7 +1805,7 @@
           <a:p>
             <a:fld id="{74FFB22B-A148-4F74-AF06-5FED847E551E}" type="datetimeFigureOut">
               <a:rPr lang="en-US" smtClean="0"/>
-              <a:t>10/18/2016</a:t>
+              <a:t>7/4/2017</a:t>
             </a:fld>
             <a:endParaRPr lang="en-US"/>
           </a:p>
@@ -1919,10 +1908,9 @@
           </a:lstStyle>
           <a:p>
             <a:r>
-              <a:rPr lang="en-US" smtClean="0"/>
+              <a:rPr lang="en-US"/>
               <a:t>Click to edit Master title style</a:t>
             </a:r>
-            <a:endParaRPr lang="en-US"/>
           </a:p>
         </p:txBody>
       </p:sp>
@@ -1976,38 +1964,37 @@
           <a:p>
             <a:pPr lvl="0"/>
             <a:r>
-              <a:rPr lang="en-US" smtClean="0"/>
+              <a:rPr lang="en-US"/>
               <a:t>Click to edit Master text styles</a:t>
             </a:r>
           </a:p>
           <a:p>
             <a:pPr lvl="1"/>
             <a:r>
-              <a:rPr lang="en-US" smtClean="0"/>
+              <a:rPr lang="en-US"/>
               <a:t>Second level</a:t>
             </a:r>
           </a:p>
           <a:p>
             <a:pPr lvl="2"/>
             <a:r>
-              <a:rPr lang="en-US" smtClean="0"/>
+              <a:rPr lang="en-US"/>
               <a:t>Third level</a:t>
             </a:r>
           </a:p>
           <a:p>
             <a:pPr lvl="3"/>
             <a:r>
-              <a:rPr lang="en-US" smtClean="0"/>
+              <a:rPr lang="en-US"/>
               <a:t>Fourth level</a:t>
             </a:r>
           </a:p>
           <a:p>
             <a:pPr lvl="4"/>
             <a:r>
-              <a:rPr lang="en-US" smtClean="0"/>
+              <a:rPr lang="en-US"/>
               <a:t>Fifth level</a:t>
             </a:r>
-            <a:endParaRPr lang="en-US"/>
           </a:p>
         </p:txBody>
       </p:sp>
@@ -2070,7 +2057,7 @@
           <a:p>
             <a:pPr lvl="0"/>
             <a:r>
-              <a:rPr lang="en-US" smtClean="0"/>
+              <a:rPr lang="en-US"/>
               <a:t>Click to edit Master text styles</a:t>
             </a:r>
           </a:p>
@@ -2093,7 +2080,7 @@
           <a:p>
             <a:fld id="{74FFB22B-A148-4F74-AF06-5FED847E551E}" type="datetimeFigureOut">
               <a:rPr lang="en-US" smtClean="0"/>
-              <a:t>10/18/2016</a:t>
+              <a:t>7/4/2017</a:t>
             </a:fld>
             <a:endParaRPr lang="en-US"/>
           </a:p>
@@ -2196,10 +2183,9 @@
           </a:lstStyle>
           <a:p>
             <a:r>
-              <a:rPr lang="en-US" smtClean="0"/>
+              <a:rPr lang="en-US"/>
               <a:t>Click to edit Master title style</a:t>
             </a:r>
-            <a:endParaRPr lang="en-US"/>
           </a:p>
         </p:txBody>
       </p:sp>
@@ -2323,7 +2309,7 @@
           <a:p>
             <a:pPr lvl="0"/>
             <a:r>
-              <a:rPr lang="en-US" smtClean="0"/>
+              <a:rPr lang="en-US"/>
               <a:t>Click to edit Master text styles</a:t>
             </a:r>
           </a:p>
@@ -2346,7 +2332,7 @@
           <a:p>
             <a:fld id="{74FFB22B-A148-4F74-AF06-5FED847E551E}" type="datetimeFigureOut">
               <a:rPr lang="en-US" smtClean="0"/>
-              <a:t>10/18/2016</a:t>
+              <a:t>7/4/2017</a:t>
             </a:fld>
             <a:endParaRPr lang="en-US"/>
           </a:p>
@@ -2455,10 +2441,9 @@
           <a:lstStyle/>
           <a:p>
             <a:r>
-              <a:rPr lang="en-US" smtClean="0"/>
+              <a:rPr lang="en-US"/>
               <a:t>Click to edit Master title style</a:t>
             </a:r>
-            <a:endParaRPr lang="en-US"/>
           </a:p>
         </p:txBody>
       </p:sp>
@@ -2489,38 +2474,37 @@
           <a:p>
             <a:pPr lvl="0"/>
             <a:r>
-              <a:rPr lang="en-US" smtClean="0"/>
+              <a:rPr lang="en-US"/>
               <a:t>Click to edit Master text styles</a:t>
             </a:r>
           </a:p>
           <a:p>
             <a:pPr lvl="1"/>
             <a:r>
-              <a:rPr lang="en-US" smtClean="0"/>
+              <a:rPr lang="en-US"/>
               <a:t>Second level</a:t>
             </a:r>
           </a:p>
           <a:p>
             <a:pPr lvl="2"/>
             <a:r>
-              <a:rPr lang="en-US" smtClean="0"/>
+              <a:rPr lang="en-US"/>
               <a:t>Third level</a:t>
             </a:r>
           </a:p>
           <a:p>
             <a:pPr lvl="3"/>
             <a:r>
-              <a:rPr lang="en-US" smtClean="0"/>
+              <a:rPr lang="en-US"/>
               <a:t>Fourth level</a:t>
             </a:r>
           </a:p>
           <a:p>
             <a:pPr lvl="4"/>
             <a:r>
-              <a:rPr lang="en-US" smtClean="0"/>
+              <a:rPr lang="en-US"/>
               <a:t>Fifth level</a:t>
             </a:r>
-            <a:endParaRPr lang="en-US"/>
           </a:p>
         </p:txBody>
       </p:sp>
@@ -2559,7 +2543,7 @@
           <a:p>
             <a:fld id="{74FFB22B-A148-4F74-AF06-5FED847E551E}" type="datetimeFigureOut">
               <a:rPr lang="en-US" smtClean="0"/>
-              <a:t>10/18/2016</a:t>
+              <a:t>7/4/2017</a:t>
             </a:fld>
             <a:endParaRPr lang="en-US"/>
           </a:p>
@@ -2966,28 +2950,22 @@
       </p:grpSpPr>
       <p:pic>
         <p:nvPicPr>
-          <p:cNvPr id="4" name="Picture 3"/>
+          <p:cNvPr id="2" name="Picture 1"/>
           <p:cNvPicPr>
             <a:picLocks noChangeAspect="1"/>
           </p:cNvPicPr>
           <p:nvPr/>
         </p:nvPicPr>
         <p:blipFill>
-          <a:blip r:embed="rId2">
-            <a:extLst>
-              <a:ext uri="{28A0092B-C50C-407E-A947-70E740481C1C}">
-                <a14:useLocalDpi xmlns:a14="http://schemas.microsoft.com/office/drawing/2010/main" val="0"/>
-              </a:ext>
-            </a:extLst>
-          </a:blip>
+          <a:blip r:embed="rId2"/>
           <a:stretch>
             <a:fillRect/>
           </a:stretch>
         </p:blipFill>
         <p:spPr>
           <a:xfrm>
-            <a:off x="569493" y="0"/>
-            <a:ext cx="11269579" cy="6875854"/>
+            <a:off x="0" y="0"/>
+            <a:ext cx="11669563" cy="6858000"/>
           </a:xfrm>
           <a:prstGeom prst="rect">
             <a:avLst/>
@@ -3037,7 +3015,7 @@
           <a:p>
             <a:pPr algn="ctr"/>
             <a:r>
-              <a:rPr lang="fi-FI" dirty="0" smtClean="0">
+              <a:rPr lang="fi-FI" dirty="0">
                 <a:solidFill>
                   <a:srgbClr val="FF0000"/>
                 </a:solidFill>
@@ -3060,7 +3038,7 @@
         </p:nvSpPr>
         <p:spPr>
           <a:xfrm rot="20403687">
-            <a:off x="2271865" y="201628"/>
+            <a:off x="2263844" y="133927"/>
             <a:ext cx="1141031" cy="2022843"/>
           </a:xfrm>
           <a:prstGeom prst="upArrow">
@@ -3092,7 +3070,7 @@
           <a:p>
             <a:pPr algn="ctr"/>
             <a:r>
-              <a:rPr lang="fi-FI" dirty="0" smtClean="0">
+              <a:rPr lang="fi-FI" dirty="0">
                 <a:solidFill>
                   <a:schemeClr val="tx1"/>
                 </a:solidFill>

</xml_diff>